<commit_message>
increase font size of fig
</commit_message>
<xml_diff>
--- a/man/figures/2022-10-18_ss_structure.pptx
+++ b/man/figures/2022-10-18_ss_structure.pptx
@@ -8,6 +8,7 @@
     <p:sldId id="257" r:id="rId2"/>
     <p:sldId id="258" r:id="rId3"/>
     <p:sldId id="259" r:id="rId4"/>
+    <p:sldId id="260" r:id="rId5"/>
   </p:sldIdLst>
   <p:sldSz cx="19800888" cy="7920038"/>
   <p:notesSz cx="6858000" cy="9144000"/>
@@ -109,12 +110,12 @@
   <p:extLst>
     <p:ext uri="{EFAFB233-063F-42B5-8137-9DF3F51BA10A}">
       <p15:sldGuideLst xmlns:p15="http://schemas.microsoft.com/office/powerpoint/2012/main">
-        <p15:guide id="1" orient="horz" pos="2495" userDrawn="1">
+        <p15:guide id="1" orient="horz" pos="3606" userDrawn="1">
           <p15:clr>
             <a:srgbClr val="A4A3A4"/>
           </p15:clr>
         </p15:guide>
-        <p15:guide id="2" pos="6237" userDrawn="1">
+        <p15:guide id="2" pos="1655" userDrawn="1">
           <p15:clr>
             <a:srgbClr val="A4A3A4"/>
           </p15:clr>
@@ -6113,6 +6114,1036 @@
 </p:sld>
 </file>
 
+<file path=ppt/slides/slide4.xml><?xml version="1.0" encoding="utf-8"?>
+<p:sld xmlns:a="http://schemas.openxmlformats.org/drawingml/2006/main" xmlns:r="http://schemas.openxmlformats.org/officeDocument/2006/relationships" xmlns:p="http://schemas.openxmlformats.org/presentationml/2006/main">
+  <p:cSld>
+    <p:spTree>
+      <p:nvGrpSpPr>
+        <p:cNvPr id="1" name=""/>
+        <p:cNvGrpSpPr/>
+        <p:nvPr/>
+      </p:nvGrpSpPr>
+      <p:grpSpPr>
+        <a:xfrm>
+          <a:off x="0" y="0"/>
+          <a:ext cx="0" cy="0"/>
+          <a:chOff x="0" y="0"/>
+          <a:chExt cx="0" cy="0"/>
+        </a:xfrm>
+      </p:grpSpPr>
+      <p:sp>
+        <p:nvSpPr>
+          <p:cNvPr id="2" name="Rectangle: Rounded Corners 1">
+            <a:extLst>
+              <a:ext uri="{FF2B5EF4-FFF2-40B4-BE49-F238E27FC236}">
+                <a16:creationId xmlns:a16="http://schemas.microsoft.com/office/drawing/2014/main" id="{3AC0FA4E-FCE2-F81E-ED17-129B3E555F08}"/>
+              </a:ext>
+            </a:extLst>
+          </p:cNvPr>
+          <p:cNvSpPr/>
+          <p:nvPr/>
+        </p:nvSpPr>
+        <p:spPr>
+          <a:xfrm>
+            <a:off x="365055" y="6126474"/>
+            <a:ext cx="4530056" cy="1260000"/>
+          </a:xfrm>
+          <a:prstGeom prst="roundRect">
+            <a:avLst/>
+          </a:prstGeom>
+          <a:solidFill>
+            <a:schemeClr val="tx2">
+              <a:lumMod val="60000"/>
+              <a:lumOff val="40000"/>
+            </a:schemeClr>
+          </a:solidFill>
+          <a:ln w="57150">
+            <a:solidFill>
+              <a:schemeClr val="tx2">
+                <a:lumMod val="50000"/>
+              </a:schemeClr>
+            </a:solidFill>
+          </a:ln>
+        </p:spPr>
+        <p:style>
+          <a:lnRef idx="2">
+            <a:schemeClr val="accent1">
+              <a:shade val="50000"/>
+            </a:schemeClr>
+          </a:lnRef>
+          <a:fillRef idx="1">
+            <a:schemeClr val="accent1"/>
+          </a:fillRef>
+          <a:effectRef idx="0">
+            <a:schemeClr val="accent1"/>
+          </a:effectRef>
+          <a:fontRef idx="minor">
+            <a:schemeClr val="lt1"/>
+          </a:fontRef>
+        </p:style>
+        <p:txBody>
+          <a:bodyPr rtlCol="0" anchor="t" anchorCtr="0"/>
+          <a:lstStyle/>
+          <a:p>
+            <a:pPr algn="ctr"/>
+            <a:r>
+              <a:rPr lang="en-CA" sz="2400" b="1" dirty="0" err="1"/>
+              <a:t>ss_read_aquameaure_data</a:t>
+            </a:r>
+            <a:r>
+              <a:rPr lang="en-CA" sz="2400" b="1" dirty="0"/>
+              <a:t>()</a:t>
+            </a:r>
+            <a:endParaRPr lang="en-CA" sz="2400" dirty="0"/>
+          </a:p>
+          <a:p>
+            <a:pPr algn="ctr"/>
+            <a:r>
+              <a:rPr lang="en-US" sz="2400" dirty="0"/>
+              <a:t>Import data from </a:t>
+            </a:r>
+            <a:r>
+              <a:rPr lang="en-US" sz="2400" dirty="0" err="1"/>
+              <a:t>aquameasure</a:t>
+            </a:r>
+            <a:r>
+              <a:rPr lang="en-US" sz="2400" dirty="0"/>
+              <a:t> csv files</a:t>
+            </a:r>
+            <a:endParaRPr lang="en-CA" sz="2400" dirty="0"/>
+          </a:p>
+        </p:txBody>
+      </p:sp>
+      <p:sp>
+        <p:nvSpPr>
+          <p:cNvPr id="10" name="Rectangle: Rounded Corners 9">
+            <a:extLst>
+              <a:ext uri="{FF2B5EF4-FFF2-40B4-BE49-F238E27FC236}">
+                <a16:creationId xmlns:a16="http://schemas.microsoft.com/office/drawing/2014/main" id="{21C5B694-E381-A39E-83C9-CB9CD50053EE}"/>
+              </a:ext>
+            </a:extLst>
+          </p:cNvPr>
+          <p:cNvSpPr/>
+          <p:nvPr/>
+        </p:nvSpPr>
+        <p:spPr>
+          <a:xfrm>
+            <a:off x="5201379" y="6113263"/>
+            <a:ext cx="4629324" cy="1260000"/>
+          </a:xfrm>
+          <a:prstGeom prst="roundRect">
+            <a:avLst/>
+          </a:prstGeom>
+          <a:solidFill>
+            <a:schemeClr val="accent1">
+              <a:lumMod val="60000"/>
+              <a:lumOff val="40000"/>
+            </a:schemeClr>
+          </a:solidFill>
+          <a:ln w="57150">
+            <a:solidFill>
+              <a:schemeClr val="accent1">
+                <a:lumMod val="50000"/>
+              </a:schemeClr>
+            </a:solidFill>
+          </a:ln>
+        </p:spPr>
+        <p:style>
+          <a:lnRef idx="2">
+            <a:schemeClr val="accent1">
+              <a:shade val="50000"/>
+            </a:schemeClr>
+          </a:lnRef>
+          <a:fillRef idx="1">
+            <a:schemeClr val="accent1"/>
+          </a:fillRef>
+          <a:effectRef idx="0">
+            <a:schemeClr val="accent1"/>
+          </a:effectRef>
+          <a:fontRef idx="minor">
+            <a:schemeClr val="lt1"/>
+          </a:fontRef>
+        </p:style>
+        <p:txBody>
+          <a:bodyPr rtlCol="0" anchor="t" anchorCtr="0"/>
+          <a:lstStyle/>
+          <a:p>
+            <a:pPr algn="ctr"/>
+            <a:r>
+              <a:rPr lang="en-CA" sz="2400" b="1" dirty="0" err="1"/>
+              <a:t>ss_read_hobo_data</a:t>
+            </a:r>
+            <a:r>
+              <a:rPr lang="en-CA" sz="2400" b="1" dirty="0"/>
+              <a:t>()</a:t>
+            </a:r>
+          </a:p>
+          <a:p>
+            <a:pPr algn="ctr"/>
+            <a:r>
+              <a:rPr lang="en-US" sz="2400" dirty="0"/>
+              <a:t>Import data from hobo and tidbit csv files</a:t>
+            </a:r>
+            <a:endParaRPr lang="en-CA" sz="2400" dirty="0"/>
+          </a:p>
+        </p:txBody>
+      </p:sp>
+      <p:sp>
+        <p:nvSpPr>
+          <p:cNvPr id="11" name="Rectangle: Rounded Corners 10">
+            <a:extLst>
+              <a:ext uri="{FF2B5EF4-FFF2-40B4-BE49-F238E27FC236}">
+                <a16:creationId xmlns:a16="http://schemas.microsoft.com/office/drawing/2014/main" id="{652AE1C8-9A44-B8B4-6E3B-A553EFC4F5C5}"/>
+              </a:ext>
+            </a:extLst>
+          </p:cNvPr>
+          <p:cNvSpPr/>
+          <p:nvPr/>
+        </p:nvSpPr>
+        <p:spPr>
+          <a:xfrm>
+            <a:off x="10088357" y="6095035"/>
+            <a:ext cx="4629324" cy="1260000"/>
+          </a:xfrm>
+          <a:prstGeom prst="roundRect">
+            <a:avLst/>
+          </a:prstGeom>
+          <a:solidFill>
+            <a:schemeClr val="accent5">
+              <a:lumMod val="60000"/>
+              <a:lumOff val="40000"/>
+            </a:schemeClr>
+          </a:solidFill>
+          <a:ln w="57150">
+            <a:solidFill>
+              <a:schemeClr val="accent5">
+                <a:lumMod val="50000"/>
+              </a:schemeClr>
+            </a:solidFill>
+          </a:ln>
+        </p:spPr>
+        <p:style>
+          <a:lnRef idx="2">
+            <a:schemeClr val="accent1">
+              <a:shade val="50000"/>
+            </a:schemeClr>
+          </a:lnRef>
+          <a:fillRef idx="1">
+            <a:schemeClr val="accent1"/>
+          </a:fillRef>
+          <a:effectRef idx="0">
+            <a:schemeClr val="accent1"/>
+          </a:effectRef>
+          <a:fontRef idx="minor">
+            <a:schemeClr val="lt1"/>
+          </a:fontRef>
+        </p:style>
+        <p:txBody>
+          <a:bodyPr rtlCol="0" anchor="t" anchorCtr="0"/>
+          <a:lstStyle/>
+          <a:p>
+            <a:pPr algn="ctr"/>
+            <a:r>
+              <a:rPr lang="en-CA" sz="2400" b="1" dirty="0" err="1"/>
+              <a:t>ss_read_vemco_data</a:t>
+            </a:r>
+            <a:r>
+              <a:rPr lang="en-CA" sz="2400" b="1" dirty="0"/>
+              <a:t>()</a:t>
+            </a:r>
+          </a:p>
+          <a:p>
+            <a:pPr algn="ctr"/>
+            <a:r>
+              <a:rPr lang="en-US" sz="2400" dirty="0"/>
+              <a:t>Import data from </a:t>
+            </a:r>
+            <a:r>
+              <a:rPr lang="en-US" sz="2400" dirty="0" err="1"/>
+              <a:t>Vemco</a:t>
+            </a:r>
+            <a:r>
+              <a:rPr lang="en-US" sz="2400" dirty="0"/>
+              <a:t> csv files</a:t>
+            </a:r>
+            <a:endParaRPr lang="en-CA" sz="2400" dirty="0"/>
+          </a:p>
+        </p:txBody>
+      </p:sp>
+      <p:sp>
+        <p:nvSpPr>
+          <p:cNvPr id="15" name="Rectangle: Rounded Corners 14">
+            <a:extLst>
+              <a:ext uri="{FF2B5EF4-FFF2-40B4-BE49-F238E27FC236}">
+                <a16:creationId xmlns:a16="http://schemas.microsoft.com/office/drawing/2014/main" id="{84AEF5AA-CC09-E21F-5E26-FD5150BF9561}"/>
+              </a:ext>
+            </a:extLst>
+          </p:cNvPr>
+          <p:cNvSpPr/>
+          <p:nvPr/>
+        </p:nvSpPr>
+        <p:spPr>
+          <a:xfrm>
+            <a:off x="14975335" y="6072541"/>
+            <a:ext cx="4530056" cy="1260000"/>
+          </a:xfrm>
+          <a:prstGeom prst="roundRect">
+            <a:avLst/>
+          </a:prstGeom>
+          <a:solidFill>
+            <a:srgbClr val="08584E"/>
+          </a:solidFill>
+          <a:ln w="57150">
+            <a:solidFill>
+              <a:srgbClr val="042E29"/>
+            </a:solidFill>
+          </a:ln>
+        </p:spPr>
+        <p:style>
+          <a:lnRef idx="2">
+            <a:schemeClr val="accent1">
+              <a:shade val="50000"/>
+            </a:schemeClr>
+          </a:lnRef>
+          <a:fillRef idx="1">
+            <a:schemeClr val="accent1"/>
+          </a:fillRef>
+          <a:effectRef idx="0">
+            <a:schemeClr val="accent1"/>
+          </a:effectRef>
+          <a:fontRef idx="minor">
+            <a:schemeClr val="lt1"/>
+          </a:fontRef>
+        </p:style>
+        <p:txBody>
+          <a:bodyPr rtlCol="0" anchor="t" anchorCtr="0"/>
+          <a:lstStyle/>
+          <a:p>
+            <a:pPr algn="ctr"/>
+            <a:r>
+              <a:rPr lang="en-CA" sz="2400" b="1" dirty="0" err="1"/>
+              <a:t>ss_read_log</a:t>
+            </a:r>
+            <a:r>
+              <a:rPr lang="en-CA" sz="2400" b="1" dirty="0"/>
+              <a:t>()</a:t>
+            </a:r>
+          </a:p>
+          <a:p>
+            <a:pPr algn="ctr"/>
+            <a:r>
+              <a:rPr lang="en-US" sz="2400" dirty="0"/>
+              <a:t>Extract information from deployment log</a:t>
+            </a:r>
+            <a:endParaRPr lang="en-CA" sz="2400" dirty="0"/>
+          </a:p>
+        </p:txBody>
+      </p:sp>
+      <p:sp>
+        <p:nvSpPr>
+          <p:cNvPr id="16" name="Rectangle: Rounded Corners 15">
+            <a:extLst>
+              <a:ext uri="{FF2B5EF4-FFF2-40B4-BE49-F238E27FC236}">
+                <a16:creationId xmlns:a16="http://schemas.microsoft.com/office/drawing/2014/main" id="{E138BF43-A9AB-DF56-C509-0436E6466313}"/>
+              </a:ext>
+            </a:extLst>
+          </p:cNvPr>
+          <p:cNvSpPr/>
+          <p:nvPr/>
+        </p:nvSpPr>
+        <p:spPr>
+          <a:xfrm>
+            <a:off x="5099779" y="530344"/>
+            <a:ext cx="4629324" cy="1620456"/>
+          </a:xfrm>
+          <a:prstGeom prst="roundRect">
+            <a:avLst/>
+          </a:prstGeom>
+          <a:solidFill>
+            <a:schemeClr val="bg1">
+              <a:lumMod val="50000"/>
+            </a:schemeClr>
+          </a:solidFill>
+          <a:ln w="57150">
+            <a:solidFill>
+              <a:schemeClr val="tx1">
+                <a:lumMod val="75000"/>
+                <a:lumOff val="25000"/>
+              </a:schemeClr>
+            </a:solidFill>
+          </a:ln>
+        </p:spPr>
+        <p:style>
+          <a:lnRef idx="2">
+            <a:schemeClr val="accent3">
+              <a:shade val="50000"/>
+            </a:schemeClr>
+          </a:lnRef>
+          <a:fillRef idx="1">
+            <a:schemeClr val="accent3"/>
+          </a:fillRef>
+          <a:effectRef idx="0">
+            <a:schemeClr val="accent3"/>
+          </a:effectRef>
+          <a:fontRef idx="minor">
+            <a:schemeClr val="lt1"/>
+          </a:fontRef>
+        </p:style>
+        <p:txBody>
+          <a:bodyPr rtlCol="0" anchor="t" anchorCtr="0"/>
+          <a:lstStyle/>
+          <a:p>
+            <a:pPr algn="ctr"/>
+            <a:r>
+              <a:rPr lang="en-CA" sz="2400" b="1" dirty="0" err="1"/>
+              <a:t>ss_compile_deployment_data</a:t>
+            </a:r>
+            <a:r>
+              <a:rPr lang="en-CA" sz="2400" b="1" dirty="0"/>
+              <a:t>()</a:t>
+            </a:r>
+            <a:endParaRPr lang="en-CA" sz="2400" dirty="0"/>
+          </a:p>
+          <a:p>
+            <a:pPr algn="ctr"/>
+            <a:r>
+              <a:rPr lang="en-US" sz="2400" dirty="0"/>
+              <a:t>Compile </a:t>
+            </a:r>
+            <a:r>
+              <a:rPr lang="en-US" sz="2400" dirty="0" err="1"/>
+              <a:t>aquameasure</a:t>
+            </a:r>
+            <a:r>
+              <a:rPr lang="en-US" sz="2400" dirty="0"/>
+              <a:t>, hobo, and </a:t>
+            </a:r>
+            <a:r>
+              <a:rPr lang="en-US" sz="2400" dirty="0" err="1"/>
+              <a:t>vemco</a:t>
+            </a:r>
+            <a:r>
+              <a:rPr lang="en-US" sz="2400" dirty="0"/>
+              <a:t> data from a single deployment</a:t>
+            </a:r>
+          </a:p>
+        </p:txBody>
+      </p:sp>
+      <p:cxnSp>
+        <p:nvCxnSpPr>
+          <p:cNvPr id="20" name="Straight Arrow Connector 19">
+            <a:extLst>
+              <a:ext uri="{FF2B5EF4-FFF2-40B4-BE49-F238E27FC236}">
+                <a16:creationId xmlns:a16="http://schemas.microsoft.com/office/drawing/2014/main" id="{C34435EC-6933-CFD8-34B1-053C6428E868}"/>
+              </a:ext>
+            </a:extLst>
+          </p:cNvPr>
+          <p:cNvCxnSpPr>
+            <a:cxnSpLocks/>
+          </p:cNvCxnSpPr>
+          <p:nvPr/>
+        </p:nvCxnSpPr>
+        <p:spPr>
+          <a:xfrm flipV="1">
+            <a:off x="2642783" y="5185241"/>
+            <a:ext cx="0" cy="900000"/>
+          </a:xfrm>
+          <a:prstGeom prst="straightConnector1">
+            <a:avLst/>
+          </a:prstGeom>
+          <a:ln w="76200">
+            <a:solidFill>
+              <a:schemeClr val="tx2">
+                <a:lumMod val="50000"/>
+              </a:schemeClr>
+            </a:solidFill>
+            <a:tailEnd type="triangle"/>
+          </a:ln>
+        </p:spPr>
+        <p:style>
+          <a:lnRef idx="1">
+            <a:schemeClr val="accent1"/>
+          </a:lnRef>
+          <a:fillRef idx="0">
+            <a:schemeClr val="accent1"/>
+          </a:fillRef>
+          <a:effectRef idx="0">
+            <a:schemeClr val="accent1"/>
+          </a:effectRef>
+          <a:fontRef idx="minor">
+            <a:schemeClr val="tx1"/>
+          </a:fontRef>
+        </p:style>
+      </p:cxnSp>
+      <p:cxnSp>
+        <p:nvCxnSpPr>
+          <p:cNvPr id="24" name="Straight Arrow Connector 23">
+            <a:extLst>
+              <a:ext uri="{FF2B5EF4-FFF2-40B4-BE49-F238E27FC236}">
+                <a16:creationId xmlns:a16="http://schemas.microsoft.com/office/drawing/2014/main" id="{9B91D801-B04E-B079-9599-481A214EEA00}"/>
+              </a:ext>
+            </a:extLst>
+          </p:cNvPr>
+          <p:cNvCxnSpPr>
+            <a:cxnSpLocks/>
+          </p:cNvCxnSpPr>
+          <p:nvPr/>
+        </p:nvCxnSpPr>
+        <p:spPr>
+          <a:xfrm flipV="1">
+            <a:off x="7503188" y="5195035"/>
+            <a:ext cx="0" cy="900000"/>
+          </a:xfrm>
+          <a:prstGeom prst="straightConnector1">
+            <a:avLst/>
+          </a:prstGeom>
+          <a:ln w="76200">
+            <a:solidFill>
+              <a:schemeClr val="accent1">
+                <a:lumMod val="50000"/>
+              </a:schemeClr>
+            </a:solidFill>
+            <a:tailEnd type="triangle"/>
+          </a:ln>
+        </p:spPr>
+        <p:style>
+          <a:lnRef idx="1">
+            <a:schemeClr val="accent1"/>
+          </a:lnRef>
+          <a:fillRef idx="0">
+            <a:schemeClr val="accent1"/>
+          </a:fillRef>
+          <a:effectRef idx="0">
+            <a:schemeClr val="accent1"/>
+          </a:effectRef>
+          <a:fontRef idx="minor">
+            <a:schemeClr val="tx1"/>
+          </a:fontRef>
+        </p:style>
+      </p:cxnSp>
+      <p:cxnSp>
+        <p:nvCxnSpPr>
+          <p:cNvPr id="25" name="Straight Arrow Connector 24">
+            <a:extLst>
+              <a:ext uri="{FF2B5EF4-FFF2-40B4-BE49-F238E27FC236}">
+                <a16:creationId xmlns:a16="http://schemas.microsoft.com/office/drawing/2014/main" id="{A45ADADC-4B09-47EB-2463-D816CB7E2246}"/>
+              </a:ext>
+            </a:extLst>
+          </p:cNvPr>
+          <p:cNvCxnSpPr>
+            <a:cxnSpLocks/>
+          </p:cNvCxnSpPr>
+          <p:nvPr/>
+        </p:nvCxnSpPr>
+        <p:spPr>
+          <a:xfrm flipV="1">
+            <a:off x="12399072" y="5172541"/>
+            <a:ext cx="0" cy="900000"/>
+          </a:xfrm>
+          <a:prstGeom prst="straightConnector1">
+            <a:avLst/>
+          </a:prstGeom>
+          <a:ln w="76200">
+            <a:solidFill>
+              <a:schemeClr val="accent5">
+                <a:lumMod val="50000"/>
+              </a:schemeClr>
+            </a:solidFill>
+            <a:tailEnd type="triangle"/>
+          </a:ln>
+        </p:spPr>
+        <p:style>
+          <a:lnRef idx="1">
+            <a:schemeClr val="accent1"/>
+          </a:lnRef>
+          <a:fillRef idx="0">
+            <a:schemeClr val="accent1"/>
+          </a:fillRef>
+          <a:effectRef idx="0">
+            <a:schemeClr val="accent1"/>
+          </a:effectRef>
+          <a:fontRef idx="minor">
+            <a:schemeClr val="tx1"/>
+          </a:fontRef>
+        </p:style>
+      </p:cxnSp>
+      <p:cxnSp>
+        <p:nvCxnSpPr>
+          <p:cNvPr id="27" name="Straight Connector 26">
+            <a:extLst>
+              <a:ext uri="{FF2B5EF4-FFF2-40B4-BE49-F238E27FC236}">
+                <a16:creationId xmlns:a16="http://schemas.microsoft.com/office/drawing/2014/main" id="{3F52FB9F-45B6-EB8A-F1AC-5855333F9BD3}"/>
+              </a:ext>
+            </a:extLst>
+          </p:cNvPr>
+          <p:cNvCxnSpPr/>
+          <p:nvPr/>
+        </p:nvCxnSpPr>
+        <p:spPr>
+          <a:xfrm flipV="1">
+            <a:off x="2631112" y="2649574"/>
+            <a:ext cx="0" cy="720000"/>
+          </a:xfrm>
+          <a:prstGeom prst="line">
+            <a:avLst/>
+          </a:prstGeom>
+          <a:ln w="76200">
+            <a:solidFill>
+              <a:schemeClr val="tx1">
+                <a:lumMod val="75000"/>
+                <a:lumOff val="25000"/>
+              </a:schemeClr>
+            </a:solidFill>
+          </a:ln>
+        </p:spPr>
+        <p:style>
+          <a:lnRef idx="1">
+            <a:schemeClr val="accent1"/>
+          </a:lnRef>
+          <a:fillRef idx="0">
+            <a:schemeClr val="accent1"/>
+          </a:fillRef>
+          <a:effectRef idx="0">
+            <a:schemeClr val="accent1"/>
+          </a:effectRef>
+          <a:fontRef idx="minor">
+            <a:schemeClr val="tx1"/>
+          </a:fontRef>
+        </p:style>
+      </p:cxnSp>
+      <p:cxnSp>
+        <p:nvCxnSpPr>
+          <p:cNvPr id="29" name="Straight Connector 28">
+            <a:extLst>
+              <a:ext uri="{FF2B5EF4-FFF2-40B4-BE49-F238E27FC236}">
+                <a16:creationId xmlns:a16="http://schemas.microsoft.com/office/drawing/2014/main" id="{852282A4-8697-5E1F-69FE-47739B948A2E}"/>
+              </a:ext>
+            </a:extLst>
+          </p:cNvPr>
+          <p:cNvCxnSpPr/>
+          <p:nvPr/>
+        </p:nvCxnSpPr>
+        <p:spPr>
+          <a:xfrm flipV="1">
+            <a:off x="12372992" y="2649574"/>
+            <a:ext cx="0" cy="720000"/>
+          </a:xfrm>
+          <a:prstGeom prst="line">
+            <a:avLst/>
+          </a:prstGeom>
+          <a:ln w="76200">
+            <a:solidFill>
+              <a:schemeClr val="tx1">
+                <a:lumMod val="75000"/>
+                <a:lumOff val="25000"/>
+              </a:schemeClr>
+            </a:solidFill>
+          </a:ln>
+        </p:spPr>
+        <p:style>
+          <a:lnRef idx="1">
+            <a:schemeClr val="accent1"/>
+          </a:lnRef>
+          <a:fillRef idx="0">
+            <a:schemeClr val="accent1"/>
+          </a:fillRef>
+          <a:effectRef idx="0">
+            <a:schemeClr val="accent1"/>
+          </a:effectRef>
+          <a:fontRef idx="minor">
+            <a:schemeClr val="tx1"/>
+          </a:fontRef>
+        </p:style>
+      </p:cxnSp>
+      <p:cxnSp>
+        <p:nvCxnSpPr>
+          <p:cNvPr id="31" name="Straight Connector 30">
+            <a:extLst>
+              <a:ext uri="{FF2B5EF4-FFF2-40B4-BE49-F238E27FC236}">
+                <a16:creationId xmlns:a16="http://schemas.microsoft.com/office/drawing/2014/main" id="{7034FE6B-5F49-A35A-DDAF-C854B8D219FD}"/>
+              </a:ext>
+            </a:extLst>
+          </p:cNvPr>
+          <p:cNvCxnSpPr>
+            <a:cxnSpLocks/>
+          </p:cNvCxnSpPr>
+          <p:nvPr/>
+        </p:nvCxnSpPr>
+        <p:spPr>
+          <a:xfrm>
+            <a:off x="2591411" y="2649574"/>
+            <a:ext cx="14655189" cy="0"/>
+          </a:xfrm>
+          <a:prstGeom prst="line">
+            <a:avLst/>
+          </a:prstGeom>
+          <a:ln w="76200">
+            <a:solidFill>
+              <a:schemeClr val="tx1">
+                <a:lumMod val="75000"/>
+                <a:lumOff val="25000"/>
+              </a:schemeClr>
+            </a:solidFill>
+          </a:ln>
+        </p:spPr>
+        <p:style>
+          <a:lnRef idx="1">
+            <a:schemeClr val="accent1"/>
+          </a:lnRef>
+          <a:fillRef idx="0">
+            <a:schemeClr val="accent1"/>
+          </a:fillRef>
+          <a:effectRef idx="0">
+            <a:schemeClr val="accent1"/>
+          </a:effectRef>
+          <a:fontRef idx="minor">
+            <a:schemeClr val="tx1"/>
+          </a:fontRef>
+        </p:style>
+      </p:cxnSp>
+      <p:cxnSp>
+        <p:nvCxnSpPr>
+          <p:cNvPr id="43" name="Straight Connector 42">
+            <a:extLst>
+              <a:ext uri="{FF2B5EF4-FFF2-40B4-BE49-F238E27FC236}">
+                <a16:creationId xmlns:a16="http://schemas.microsoft.com/office/drawing/2014/main" id="{68FF17D5-4627-1BCE-F555-7A474E4ABAD0}"/>
+              </a:ext>
+            </a:extLst>
+          </p:cNvPr>
+          <p:cNvCxnSpPr>
+            <a:cxnSpLocks/>
+            <a:stCxn id="15" idx="0"/>
+          </p:cNvCxnSpPr>
+          <p:nvPr/>
+        </p:nvCxnSpPr>
+        <p:spPr>
+          <a:xfrm flipH="1" flipV="1">
+            <a:off x="17209477" y="2649574"/>
+            <a:ext cx="0" cy="3422967"/>
+          </a:xfrm>
+          <a:prstGeom prst="line">
+            <a:avLst/>
+          </a:prstGeom>
+          <a:ln w="76200">
+            <a:solidFill>
+              <a:schemeClr val="tx1">
+                <a:lumMod val="75000"/>
+                <a:lumOff val="25000"/>
+              </a:schemeClr>
+            </a:solidFill>
+          </a:ln>
+        </p:spPr>
+        <p:style>
+          <a:lnRef idx="1">
+            <a:schemeClr val="accent1"/>
+          </a:lnRef>
+          <a:fillRef idx="0">
+            <a:schemeClr val="accent1"/>
+          </a:fillRef>
+          <a:effectRef idx="0">
+            <a:schemeClr val="accent1"/>
+          </a:effectRef>
+          <a:fontRef idx="minor">
+            <a:schemeClr val="tx1"/>
+          </a:fontRef>
+        </p:style>
+      </p:cxnSp>
+      <p:sp>
+        <p:nvSpPr>
+          <p:cNvPr id="12" name="Rectangle: Rounded Corners 11">
+            <a:extLst>
+              <a:ext uri="{FF2B5EF4-FFF2-40B4-BE49-F238E27FC236}">
+                <a16:creationId xmlns:a16="http://schemas.microsoft.com/office/drawing/2014/main" id="{958BC85D-B49B-55F9-89C2-610A6520CEBA}"/>
+              </a:ext>
+            </a:extLst>
+          </p:cNvPr>
+          <p:cNvSpPr/>
+          <p:nvPr/>
+        </p:nvSpPr>
+        <p:spPr>
+          <a:xfrm>
+            <a:off x="375778" y="3082904"/>
+            <a:ext cx="4530056" cy="2075715"/>
+          </a:xfrm>
+          <a:prstGeom prst="roundRect">
+            <a:avLst/>
+          </a:prstGeom>
+          <a:solidFill>
+            <a:schemeClr val="tx2">
+              <a:lumMod val="75000"/>
+            </a:schemeClr>
+          </a:solidFill>
+          <a:ln w="57150">
+            <a:solidFill>
+              <a:schemeClr val="tx2">
+                <a:lumMod val="50000"/>
+              </a:schemeClr>
+            </a:solidFill>
+          </a:ln>
+        </p:spPr>
+        <p:style>
+          <a:lnRef idx="2">
+            <a:schemeClr val="accent1">
+              <a:shade val="50000"/>
+            </a:schemeClr>
+          </a:lnRef>
+          <a:fillRef idx="1">
+            <a:schemeClr val="accent1"/>
+          </a:fillRef>
+          <a:effectRef idx="0">
+            <a:schemeClr val="accent1"/>
+          </a:effectRef>
+          <a:fontRef idx="minor">
+            <a:schemeClr val="lt1"/>
+          </a:fontRef>
+        </p:style>
+        <p:txBody>
+          <a:bodyPr rtlCol="0" anchor="t" anchorCtr="0"/>
+          <a:lstStyle/>
+          <a:p>
+            <a:pPr algn="ctr"/>
+            <a:r>
+              <a:rPr lang="en-CA" sz="2400" b="1" dirty="0" err="1"/>
+              <a:t>ss_compile_aquameaure_data</a:t>
+            </a:r>
+            <a:r>
+              <a:rPr lang="en-CA" sz="2400" b="1" dirty="0"/>
+              <a:t>()</a:t>
+            </a:r>
+            <a:endParaRPr lang="en-CA" sz="2400" dirty="0"/>
+          </a:p>
+          <a:p>
+            <a:pPr algn="ctr"/>
+            <a:r>
+              <a:rPr lang="en-US" sz="2400" dirty="0"/>
+              <a:t>Compile and format temperature, dissolved oxygen, salinity, and/or device depth data from </a:t>
+            </a:r>
+            <a:r>
+              <a:rPr lang="en-US" sz="2400" dirty="0" err="1"/>
+              <a:t>aquameasure</a:t>
+            </a:r>
+            <a:r>
+              <a:rPr lang="en-US" sz="2400" dirty="0"/>
+              <a:t> sensors</a:t>
+            </a:r>
+            <a:endParaRPr lang="en-CA" sz="2400" dirty="0"/>
+          </a:p>
+        </p:txBody>
+      </p:sp>
+      <p:sp>
+        <p:nvSpPr>
+          <p:cNvPr id="14" name="Rectangle: Rounded Corners 13">
+            <a:extLst>
+              <a:ext uri="{FF2B5EF4-FFF2-40B4-BE49-F238E27FC236}">
+                <a16:creationId xmlns:a16="http://schemas.microsoft.com/office/drawing/2014/main" id="{312EFA56-F1DC-192D-E670-DA08B991D93E}"/>
+              </a:ext>
+            </a:extLst>
+          </p:cNvPr>
+          <p:cNvSpPr/>
+          <p:nvPr/>
+        </p:nvSpPr>
+        <p:spPr>
+          <a:xfrm>
+            <a:off x="10042564" y="3084832"/>
+            <a:ext cx="4629324" cy="2073787"/>
+          </a:xfrm>
+          <a:prstGeom prst="roundRect">
+            <a:avLst/>
+          </a:prstGeom>
+          <a:solidFill>
+            <a:schemeClr val="accent5">
+              <a:lumMod val="75000"/>
+            </a:schemeClr>
+          </a:solidFill>
+          <a:ln w="57150">
+            <a:solidFill>
+              <a:schemeClr val="accent5">
+                <a:lumMod val="50000"/>
+              </a:schemeClr>
+            </a:solidFill>
+          </a:ln>
+        </p:spPr>
+        <p:style>
+          <a:lnRef idx="2">
+            <a:schemeClr val="accent1">
+              <a:shade val="50000"/>
+            </a:schemeClr>
+          </a:lnRef>
+          <a:fillRef idx="1">
+            <a:schemeClr val="accent1"/>
+          </a:fillRef>
+          <a:effectRef idx="0">
+            <a:schemeClr val="accent1"/>
+          </a:effectRef>
+          <a:fontRef idx="minor">
+            <a:schemeClr val="lt1"/>
+          </a:fontRef>
+        </p:style>
+        <p:txBody>
+          <a:bodyPr rtlCol="0" anchor="t" anchorCtr="0"/>
+          <a:lstStyle/>
+          <a:p>
+            <a:pPr algn="ctr"/>
+            <a:r>
+              <a:rPr lang="en-CA" sz="2400" b="1" dirty="0" err="1"/>
+              <a:t>ss_compile_vemco_data</a:t>
+            </a:r>
+            <a:r>
+              <a:rPr lang="en-CA" sz="2400" b="1" dirty="0"/>
+              <a:t>()</a:t>
+            </a:r>
+            <a:endParaRPr lang="en-CA" sz="2400" dirty="0"/>
+          </a:p>
+          <a:p>
+            <a:pPr algn="ctr"/>
+            <a:r>
+              <a:rPr lang="en-US" sz="2400" dirty="0"/>
+              <a:t>Compile and format temperature and/or device depth data from </a:t>
+            </a:r>
+            <a:r>
+              <a:rPr lang="en-US" sz="2400" dirty="0" err="1"/>
+              <a:t>vemco</a:t>
+            </a:r>
+            <a:r>
+              <a:rPr lang="en-US" sz="2400" dirty="0"/>
+              <a:t> sensors</a:t>
+            </a:r>
+          </a:p>
+        </p:txBody>
+      </p:sp>
+      <p:cxnSp>
+        <p:nvCxnSpPr>
+          <p:cNvPr id="39" name="Straight Arrow Connector 38">
+            <a:extLst>
+              <a:ext uri="{FF2B5EF4-FFF2-40B4-BE49-F238E27FC236}">
+                <a16:creationId xmlns:a16="http://schemas.microsoft.com/office/drawing/2014/main" id="{BD25409A-D8A9-3F75-C773-766C056DE6A4}"/>
+              </a:ext>
+            </a:extLst>
+          </p:cNvPr>
+          <p:cNvCxnSpPr>
+            <a:cxnSpLocks/>
+          </p:cNvCxnSpPr>
+          <p:nvPr/>
+        </p:nvCxnSpPr>
+        <p:spPr>
+          <a:xfrm flipV="1">
+            <a:off x="7437176" y="2163500"/>
+            <a:ext cx="0" cy="900000"/>
+          </a:xfrm>
+          <a:prstGeom prst="straightConnector1">
+            <a:avLst/>
+          </a:prstGeom>
+          <a:ln w="76200">
+            <a:solidFill>
+              <a:schemeClr val="tx1">
+                <a:lumMod val="75000"/>
+                <a:lumOff val="25000"/>
+              </a:schemeClr>
+            </a:solidFill>
+            <a:tailEnd type="triangle"/>
+          </a:ln>
+        </p:spPr>
+        <p:style>
+          <a:lnRef idx="1">
+            <a:schemeClr val="accent1"/>
+          </a:lnRef>
+          <a:fillRef idx="0">
+            <a:schemeClr val="accent1"/>
+          </a:fillRef>
+          <a:effectRef idx="0">
+            <a:schemeClr val="accent1"/>
+          </a:effectRef>
+          <a:fontRef idx="minor">
+            <a:schemeClr val="tx1"/>
+          </a:fontRef>
+        </p:style>
+      </p:cxnSp>
+      <p:sp>
+        <p:nvSpPr>
+          <p:cNvPr id="13" name="Rectangle: Rounded Corners 12">
+            <a:extLst>
+              <a:ext uri="{FF2B5EF4-FFF2-40B4-BE49-F238E27FC236}">
+                <a16:creationId xmlns:a16="http://schemas.microsoft.com/office/drawing/2014/main" id="{DF325DDA-3E96-811F-5C6B-56AB0A27DB27}"/>
+              </a:ext>
+            </a:extLst>
+          </p:cNvPr>
+          <p:cNvSpPr/>
+          <p:nvPr/>
+        </p:nvSpPr>
+        <p:spPr>
+          <a:xfrm>
+            <a:off x="5137504" y="3082904"/>
+            <a:ext cx="4629324" cy="2075715"/>
+          </a:xfrm>
+          <a:prstGeom prst="roundRect">
+            <a:avLst/>
+          </a:prstGeom>
+          <a:solidFill>
+            <a:schemeClr val="accent1">
+              <a:lumMod val="75000"/>
+            </a:schemeClr>
+          </a:solidFill>
+          <a:ln w="57150">
+            <a:solidFill>
+              <a:schemeClr val="accent1">
+                <a:lumMod val="50000"/>
+              </a:schemeClr>
+            </a:solidFill>
+          </a:ln>
+        </p:spPr>
+        <p:style>
+          <a:lnRef idx="2">
+            <a:schemeClr val="accent1">
+              <a:shade val="50000"/>
+            </a:schemeClr>
+          </a:lnRef>
+          <a:fillRef idx="1">
+            <a:schemeClr val="accent1"/>
+          </a:fillRef>
+          <a:effectRef idx="0">
+            <a:schemeClr val="accent1"/>
+          </a:effectRef>
+          <a:fontRef idx="minor">
+            <a:schemeClr val="lt1"/>
+          </a:fontRef>
+        </p:style>
+        <p:txBody>
+          <a:bodyPr rtlCol="0" anchor="t" anchorCtr="0"/>
+          <a:lstStyle/>
+          <a:p>
+            <a:pPr algn="ctr"/>
+            <a:r>
+              <a:rPr lang="en-CA" sz="2400" b="1" dirty="0" err="1"/>
+              <a:t>ss_compile_hobo_data</a:t>
+            </a:r>
+            <a:r>
+              <a:rPr lang="en-CA" sz="2400" b="1" dirty="0"/>
+              <a:t>()</a:t>
+            </a:r>
+            <a:endParaRPr lang="en-CA" sz="2400" dirty="0"/>
+          </a:p>
+          <a:p>
+            <a:pPr algn="ctr"/>
+            <a:r>
+              <a:rPr lang="en-US" sz="2400" dirty="0"/>
+              <a:t>Compile and format temperature and/or dissolved oxygen, data from hobo and tidbit sensors</a:t>
+            </a:r>
+          </a:p>
+        </p:txBody>
+      </p:sp>
+    </p:spTree>
+    <p:extLst>
+      <p:ext uri="{BB962C8B-B14F-4D97-AF65-F5344CB8AC3E}">
+        <p14:creationId xmlns:p14="http://schemas.microsoft.com/office/powerpoint/2010/main" val="3396129261"/>
+      </p:ext>
+    </p:extLst>
+  </p:cSld>
+  <p:clrMapOvr>
+    <a:masterClrMapping/>
+  </p:clrMapOvr>
+</p:sld>
+</file>
+
 <file path=ppt/theme/theme1.xml><?xml version="1.0" encoding="utf-8"?>
 <a:theme xmlns:a="http://schemas.openxmlformats.org/drawingml/2006/main" name="Office Theme">
   <a:themeElements>

</xml_diff>